<commit_message>
fix formatting in a class 14 slide, add PDF version
</commit_message>
<xml_diff>
--- a/slides/14_natural_language_processing.pptx
+++ b/slides/14_natural_language_processing.pptx
@@ -250,7 +250,7 @@
           <a:p>
             <a:fld id="{DB92F479-4B50-F243-9713-1B12EC2B4BDB}" type="datetimeFigureOut">
               <a:rPr lang="en-US" smtClean="0"/>
-              <a:t>2/8/15</a:t>
+              <a:t>2/9/2015</a:t>
             </a:fld>
             <a:endParaRPr lang="en-US"/>
           </a:p>
@@ -2090,14 +2090,14 @@
             <a:noFill/>
           </a:ln>
           <a:extLst>
-            <a:ext uri="{909E8E84-426E-40dd-AFC4-6F175D3DCCD1}">
+            <a:ext uri="{909E8E84-426E-40DD-AFC4-6F175D3DCCD1}">
               <a14:hiddenFill xmlns:a14="http://schemas.microsoft.com/office/drawing/2010/main">
                 <a:solidFill>
                   <a:srgbClr val="FFFFFF"/>
                 </a:solidFill>
               </a14:hiddenFill>
             </a:ext>
-            <a:ext uri="{91240B29-F687-4f45-9708-019B960494DF}">
+            <a:ext uri="{91240B29-F687-4F45-9708-019B960494DF}">
               <a14:hiddenLine xmlns:a14="http://schemas.microsoft.com/office/drawing/2010/main" w="12700">
                 <a:solidFill>
                   <a:srgbClr val="000000"/>
@@ -2229,7 +2229,7 @@
   <p:clrMapOvr>
     <a:masterClrMapping/>
   </p:clrMapOvr>
-  <p:transition xmlns:p14="http://schemas.microsoft.com/office/powerpoint/2010/main"/>
+  <p:transition/>
 </p:sldLayout>
 </file>
 
@@ -2278,7 +2278,7 @@
           </a:ln>
           <a:effectLst/>
           <a:extLst>
-            <a:ext uri="{AF507438-7753-43e0-B8FC-AC1667EBCBE1}">
+            <a:ext uri="{AF507438-7753-43E0-B8FC-AC1667EBCBE1}">
               <a14:hiddenEffects xmlns:a14="http://schemas.microsoft.com/office/drawing/2010/main">
                 <a:effectLst>
                   <a:outerShdw blurRad="63500" dist="38099" dir="2700000" algn="ctr" rotWithShape="0">
@@ -2320,7 +2320,7 @@
           </a:ln>
           <a:effectLst/>
           <a:extLst>
-            <a:ext uri="{AF507438-7753-43e0-B8FC-AC1667EBCBE1}">
+            <a:ext uri="{AF507438-7753-43E0-B8FC-AC1667EBCBE1}">
               <a14:hiddenEffects xmlns:a14="http://schemas.microsoft.com/office/drawing/2010/main">
                 <a:effectLst>
                   <a:outerShdw blurRad="63500" dist="38099" dir="2700000" algn="ctr" rotWithShape="0">
@@ -2362,7 +2362,7 @@
           </a:ln>
           <a:effectLst/>
           <a:extLst>
-            <a:ext uri="{AF507438-7753-43e0-B8FC-AC1667EBCBE1}">
+            <a:ext uri="{AF507438-7753-43E0-B8FC-AC1667EBCBE1}">
               <a14:hiddenEffects xmlns:a14="http://schemas.microsoft.com/office/drawing/2010/main">
                 <a:effectLst>
                   <a:outerShdw blurRad="63500" dist="38099" dir="2700000" algn="ctr" rotWithShape="0">
@@ -2404,7 +2404,7 @@
           </a:ln>
           <a:effectLst/>
           <a:extLst>
-            <a:ext uri="{AF507438-7753-43e0-B8FC-AC1667EBCBE1}">
+            <a:ext uri="{AF507438-7753-43E0-B8FC-AC1667EBCBE1}">
               <a14:hiddenEffects xmlns:a14="http://schemas.microsoft.com/office/drawing/2010/main">
                 <a:effectLst>
                   <a:outerShdw blurRad="63500" dist="38099" dir="2700000" algn="ctr" rotWithShape="0">
@@ -3184,7 +3184,7 @@
   <p:clrMapOvr>
     <a:masterClrMapping/>
   </p:clrMapOvr>
-  <p:transition xmlns:p14="http://schemas.microsoft.com/office/powerpoint/2010/main"/>
+  <p:transition/>
 </p:sldLayout>
 </file>
 
@@ -3233,7 +3233,7 @@
           </a:ln>
           <a:effectLst/>
           <a:extLst>
-            <a:ext uri="{AF507438-7753-43e0-B8FC-AC1667EBCBE1}">
+            <a:ext uri="{AF507438-7753-43E0-B8FC-AC1667EBCBE1}">
               <a14:hiddenEffects xmlns:a14="http://schemas.microsoft.com/office/drawing/2010/main">
                 <a:effectLst>
                   <a:outerShdw blurRad="63500" dist="38099" dir="2700000" algn="ctr" rotWithShape="0">
@@ -3275,7 +3275,7 @@
           </a:ln>
           <a:effectLst/>
           <a:extLst>
-            <a:ext uri="{AF507438-7753-43e0-B8FC-AC1667EBCBE1}">
+            <a:ext uri="{AF507438-7753-43E0-B8FC-AC1667EBCBE1}">
               <a14:hiddenEffects xmlns:a14="http://schemas.microsoft.com/office/drawing/2010/main">
                 <a:effectLst>
                   <a:outerShdw blurRad="63500" dist="38099" dir="2700000" algn="ctr" rotWithShape="0">
@@ -3741,7 +3741,7 @@
   <p:clrMapOvr>
     <a:masterClrMapping/>
   </p:clrMapOvr>
-  <p:transition xmlns:p14="http://schemas.microsoft.com/office/powerpoint/2010/main"/>
+  <p:transition/>
 </p:sldLayout>
 </file>
 
@@ -4041,7 +4041,7 @@
   <p:clrMapOvr>
     <a:masterClrMapping/>
   </p:clrMapOvr>
-  <p:transition xmlns:p14="http://schemas.microsoft.com/office/powerpoint/2010/main"/>
+  <p:transition/>
 </p:sldLayout>
 </file>
 
@@ -4178,7 +4178,7 @@
   <p:clrMapOvr>
     <a:masterClrMapping/>
   </p:clrMapOvr>
-  <p:transition xmlns:p14="http://schemas.microsoft.com/office/powerpoint/2010/main"/>
+  <p:transition/>
 </p:sldLayout>
 </file>
 
@@ -4345,7 +4345,7 @@
   <p:clrMapOvr>
     <a:masterClrMapping/>
   </p:clrMapOvr>
-  <p:transition xmlns:p14="http://schemas.microsoft.com/office/powerpoint/2010/main"/>
+  <p:transition/>
 </p:sldLayout>
 </file>
 
@@ -4411,7 +4411,7 @@
   <p:clrMapOvr>
     <a:masterClrMapping/>
   </p:clrMapOvr>
-  <p:transition xmlns:p14="http://schemas.microsoft.com/office/powerpoint/2010/main"/>
+  <p:transition/>
 </p:sldLayout>
 </file>
 
@@ -4688,7 +4688,7 @@
   <p:clrMapOvr>
     <a:masterClrMapping/>
   </p:clrMapOvr>
-  <p:transition xmlns:p14="http://schemas.microsoft.com/office/powerpoint/2010/main"/>
+  <p:transition/>
 </p:sldLayout>
 </file>
 
@@ -4967,7 +4967,7 @@
   <p:clrMapOvr>
     <a:masterClrMapping/>
   </p:clrMapOvr>
-  <p:transition xmlns:p14="http://schemas.microsoft.com/office/powerpoint/2010/main"/>
+  <p:transition/>
 </p:sldLayout>
 </file>
 
@@ -5014,7 +5014,7 @@
             <a:tailEnd/>
           </a:ln>
           <a:extLst>
-            <a:ext uri="{909E8E84-426E-40dd-AFC4-6F175D3DCCD1}">
+            <a:ext uri="{909E8E84-426E-40DD-AFC4-6F175D3DCCD1}">
               <a14:hiddenFill xmlns:a14="http://schemas.microsoft.com/office/drawing/2010/main">
                 <a:noFill/>
               </a14:hiddenFill>
@@ -5055,7 +5055,7 @@
             <a:tailEnd/>
           </a:ln>
           <a:extLst>
-            <a:ext uri="{909E8E84-426E-40dd-AFC4-6F175D3DCCD1}">
+            <a:ext uri="{909E8E84-426E-40DD-AFC4-6F175D3DCCD1}">
               <a14:hiddenFill xmlns:a14="http://schemas.microsoft.com/office/drawing/2010/main">
                 <a:noFill/>
               </a14:hiddenFill>
@@ -5293,7 +5293,7 @@
   <p:clrMapOvr>
     <a:masterClrMapping/>
   </p:clrMapOvr>
-  <p:transition xmlns:p14="http://schemas.microsoft.com/office/powerpoint/2010/main"/>
+  <p:transition/>
 </p:sldLayout>
 </file>
 
@@ -5340,7 +5340,7 @@
             <a:tailEnd/>
           </a:ln>
           <a:extLst>
-            <a:ext uri="{909E8E84-426E-40dd-AFC4-6F175D3DCCD1}">
+            <a:ext uri="{909E8E84-426E-40DD-AFC4-6F175D3DCCD1}">
               <a14:hiddenFill xmlns:a14="http://schemas.microsoft.com/office/drawing/2010/main">
                 <a:noFill/>
               </a14:hiddenFill>
@@ -5381,7 +5381,7 @@
             <a:tailEnd/>
           </a:ln>
           <a:extLst>
-            <a:ext uri="{909E8E84-426E-40dd-AFC4-6F175D3DCCD1}">
+            <a:ext uri="{909E8E84-426E-40DD-AFC4-6F175D3DCCD1}">
               <a14:hiddenFill xmlns:a14="http://schemas.microsoft.com/office/drawing/2010/main">
                 <a:noFill/>
               </a14:hiddenFill>
@@ -5430,14 +5430,14 @@
             <a:noFill/>
           </a:ln>
           <a:extLst>
-            <a:ext uri="{909E8E84-426E-40dd-AFC4-6F175D3DCCD1}">
+            <a:ext uri="{909E8E84-426E-40DD-AFC4-6F175D3DCCD1}">
               <a14:hiddenFill xmlns:a14="http://schemas.microsoft.com/office/drawing/2010/main">
                 <a:solidFill>
                   <a:srgbClr val="FFFFFF"/>
                 </a:solidFill>
               </a14:hiddenFill>
             </a:ext>
-            <a:ext uri="{91240B29-F687-4f45-9708-019B960494DF}">
+            <a:ext uri="{91240B29-F687-4F45-9708-019B960494DF}">
               <a14:hiddenLine xmlns:a14="http://schemas.microsoft.com/office/drawing/2010/main" w="9525">
                 <a:solidFill>
                   <a:srgbClr val="000000"/>
@@ -5646,7 +5646,7 @@
   <p:clrMapOvr>
     <a:masterClrMapping/>
   </p:clrMapOvr>
-  <p:transition xmlns:p14="http://schemas.microsoft.com/office/powerpoint/2010/main"/>
+  <p:transition/>
 </p:sldLayout>
 </file>
 
@@ -5878,7 +5878,7 @@
   <p:clrMapOvr>
     <a:masterClrMapping/>
   </p:clrMapOvr>
-  <p:transition xmlns:p14="http://schemas.microsoft.com/office/powerpoint/2010/main"/>
+  <p:transition/>
 </p:sldLayout>
 </file>
 
@@ -5933,14 +5933,14 @@
             <a:noFill/>
           </a:ln>
           <a:extLst>
-            <a:ext uri="{909E8E84-426E-40dd-AFC4-6F175D3DCCD1}">
+            <a:ext uri="{909E8E84-426E-40DD-AFC4-6F175D3DCCD1}">
               <a14:hiddenFill xmlns:a14="http://schemas.microsoft.com/office/drawing/2010/main">
                 <a:solidFill>
                   <a:srgbClr val="FFFFFF"/>
                 </a:solidFill>
               </a14:hiddenFill>
             </a:ext>
-            <a:ext uri="{91240B29-F687-4f45-9708-019B960494DF}">
+            <a:ext uri="{91240B29-F687-4F45-9708-019B960494DF}">
               <a14:hiddenLine xmlns:a14="http://schemas.microsoft.com/office/drawing/2010/main" w="9525">
                 <a:solidFill>
                   <a:srgbClr val="000000"/>
@@ -5979,7 +5979,7 @@
             <a:tailEnd/>
           </a:ln>
           <a:extLst>
-            <a:ext uri="{909E8E84-426E-40dd-AFC4-6F175D3DCCD1}">
+            <a:ext uri="{909E8E84-426E-40DD-AFC4-6F175D3DCCD1}">
               <a14:hiddenFill xmlns:a14="http://schemas.microsoft.com/office/drawing/2010/main">
                 <a:noFill/>
               </a14:hiddenFill>
@@ -6020,7 +6020,7 @@
             <a:tailEnd/>
           </a:ln>
           <a:extLst>
-            <a:ext uri="{909E8E84-426E-40dd-AFC4-6F175D3DCCD1}">
+            <a:ext uri="{909E8E84-426E-40DD-AFC4-6F175D3DCCD1}">
               <a14:hiddenFill xmlns:a14="http://schemas.microsoft.com/office/drawing/2010/main">
                 <a:noFill/>
               </a14:hiddenFill>
@@ -6231,7 +6231,7 @@
   <p:clrMapOvr>
     <a:masterClrMapping/>
   </p:clrMapOvr>
-  <p:transition xmlns:p14="http://schemas.microsoft.com/office/powerpoint/2010/main"/>
+  <p:transition/>
 </p:sldLayout>
 </file>
 
@@ -6286,14 +6286,14 @@
             <a:noFill/>
           </a:ln>
           <a:extLst>
-            <a:ext uri="{909E8E84-426E-40dd-AFC4-6F175D3DCCD1}">
+            <a:ext uri="{909E8E84-426E-40DD-AFC4-6F175D3DCCD1}">
               <a14:hiddenFill xmlns:a14="http://schemas.microsoft.com/office/drawing/2010/main">
                 <a:solidFill>
                   <a:srgbClr val="FFFFFF"/>
                 </a:solidFill>
               </a14:hiddenFill>
             </a:ext>
-            <a:ext uri="{91240B29-F687-4f45-9708-019B960494DF}">
+            <a:ext uri="{91240B29-F687-4F45-9708-019B960494DF}">
               <a14:hiddenLine xmlns:a14="http://schemas.microsoft.com/office/drawing/2010/main" w="9525">
                 <a:solidFill>
                   <a:srgbClr val="000000"/>
@@ -6332,7 +6332,7 @@
             <a:tailEnd/>
           </a:ln>
           <a:extLst>
-            <a:ext uri="{909E8E84-426E-40dd-AFC4-6F175D3DCCD1}">
+            <a:ext uri="{909E8E84-426E-40DD-AFC4-6F175D3DCCD1}">
               <a14:hiddenFill xmlns:a14="http://schemas.microsoft.com/office/drawing/2010/main">
                 <a:noFill/>
               </a14:hiddenFill>
@@ -6373,7 +6373,7 @@
             <a:tailEnd/>
           </a:ln>
           <a:extLst>
-            <a:ext uri="{909E8E84-426E-40dd-AFC4-6F175D3DCCD1}">
+            <a:ext uri="{909E8E84-426E-40DD-AFC4-6F175D3DCCD1}">
               <a14:hiddenFill xmlns:a14="http://schemas.microsoft.com/office/drawing/2010/main">
                 <a:noFill/>
               </a14:hiddenFill>
@@ -6584,7 +6584,7 @@
   <p:clrMapOvr>
     <a:masterClrMapping/>
   </p:clrMapOvr>
-  <p:transition xmlns:p14="http://schemas.microsoft.com/office/powerpoint/2010/main"/>
+  <p:transition/>
 </p:sldLayout>
 </file>
 
@@ -6639,14 +6639,14 @@
             <a:noFill/>
           </a:ln>
           <a:extLst>
-            <a:ext uri="{909E8E84-426E-40dd-AFC4-6F175D3DCCD1}">
+            <a:ext uri="{909E8E84-426E-40DD-AFC4-6F175D3DCCD1}">
               <a14:hiddenFill xmlns:a14="http://schemas.microsoft.com/office/drawing/2010/main">
                 <a:solidFill>
                   <a:srgbClr val="FFFFFF"/>
                 </a:solidFill>
               </a14:hiddenFill>
             </a:ext>
-            <a:ext uri="{91240B29-F687-4f45-9708-019B960494DF}">
+            <a:ext uri="{91240B29-F687-4F45-9708-019B960494DF}">
               <a14:hiddenLine xmlns:a14="http://schemas.microsoft.com/office/drawing/2010/main" w="9525">
                 <a:solidFill>
                   <a:srgbClr val="000000"/>
@@ -6685,7 +6685,7 @@
             <a:tailEnd/>
           </a:ln>
           <a:extLst>
-            <a:ext uri="{909E8E84-426E-40dd-AFC4-6F175D3DCCD1}">
+            <a:ext uri="{909E8E84-426E-40DD-AFC4-6F175D3DCCD1}">
               <a14:hiddenFill xmlns:a14="http://schemas.microsoft.com/office/drawing/2010/main">
                 <a:noFill/>
               </a14:hiddenFill>
@@ -6726,7 +6726,7 @@
             <a:tailEnd/>
           </a:ln>
           <a:extLst>
-            <a:ext uri="{909E8E84-426E-40dd-AFC4-6F175D3DCCD1}">
+            <a:ext uri="{909E8E84-426E-40DD-AFC4-6F175D3DCCD1}">
               <a14:hiddenFill xmlns:a14="http://schemas.microsoft.com/office/drawing/2010/main">
                 <a:noFill/>
               </a14:hiddenFill>
@@ -7081,7 +7081,7 @@
   <p:clrMapOvr>
     <a:masterClrMapping/>
   </p:clrMapOvr>
-  <p:transition xmlns:p14="http://schemas.microsoft.com/office/powerpoint/2010/main"/>
+  <p:transition/>
 </p:sldLayout>
 </file>
 
@@ -7130,7 +7130,7 @@
           </a:ln>
           <a:effectLst/>
           <a:extLst>
-            <a:ext uri="{AF507438-7753-43e0-B8FC-AC1667EBCBE1}">
+            <a:ext uri="{AF507438-7753-43E0-B8FC-AC1667EBCBE1}">
               <a14:hiddenEffects xmlns:a14="http://schemas.microsoft.com/office/drawing/2010/main">
                 <a:effectLst>
                   <a:outerShdw blurRad="63500" dist="38099" dir="2700000" algn="ctr" rotWithShape="0">
@@ -7172,7 +7172,7 @@
           </a:ln>
           <a:effectLst/>
           <a:extLst>
-            <a:ext uri="{AF507438-7753-43e0-B8FC-AC1667EBCBE1}">
+            <a:ext uri="{AF507438-7753-43E0-B8FC-AC1667EBCBE1}">
               <a14:hiddenEffects xmlns:a14="http://schemas.microsoft.com/office/drawing/2010/main">
                 <a:effectLst>
                   <a:outerShdw blurRad="63500" dist="38099" dir="2700000" algn="ctr" rotWithShape="0">
@@ -7214,7 +7214,7 @@
           </a:ln>
           <a:effectLst/>
           <a:extLst>
-            <a:ext uri="{AF507438-7753-43e0-B8FC-AC1667EBCBE1}">
+            <a:ext uri="{AF507438-7753-43E0-B8FC-AC1667EBCBE1}">
               <a14:hiddenEffects xmlns:a14="http://schemas.microsoft.com/office/drawing/2010/main">
                 <a:effectLst>
                   <a:outerShdw blurRad="63500" dist="38099" dir="2700000" algn="ctr" rotWithShape="0">
@@ -7256,7 +7256,7 @@
           </a:ln>
           <a:effectLst/>
           <a:extLst>
-            <a:ext uri="{AF507438-7753-43e0-B8FC-AC1667EBCBE1}">
+            <a:ext uri="{AF507438-7753-43E0-B8FC-AC1667EBCBE1}">
               <a14:hiddenEffects xmlns:a14="http://schemas.microsoft.com/office/drawing/2010/main">
                 <a:effectLst>
                   <a:outerShdw blurRad="63500" dist="38099" dir="2700000" algn="ctr" rotWithShape="0">
@@ -8046,7 +8046,7 @@
   <p:clrMapOvr>
     <a:masterClrMapping/>
   </p:clrMapOvr>
-  <p:transition xmlns:p14="http://schemas.microsoft.com/office/powerpoint/2010/main"/>
+  <p:transition/>
 </p:sldLayout>
 </file>
 
@@ -8095,7 +8095,7 @@
           </a:ln>
           <a:effectLst/>
           <a:extLst>
-            <a:ext uri="{AF507438-7753-43e0-B8FC-AC1667EBCBE1}">
+            <a:ext uri="{AF507438-7753-43E0-B8FC-AC1667EBCBE1}">
               <a14:hiddenEffects xmlns:a14="http://schemas.microsoft.com/office/drawing/2010/main">
                 <a:effectLst>
                   <a:outerShdw blurRad="63500" dist="38099" dir="2700000" algn="ctr" rotWithShape="0">
@@ -8137,7 +8137,7 @@
           </a:ln>
           <a:effectLst/>
           <a:extLst>
-            <a:ext uri="{AF507438-7753-43e0-B8FC-AC1667EBCBE1}">
+            <a:ext uri="{AF507438-7753-43E0-B8FC-AC1667EBCBE1}">
               <a14:hiddenEffects xmlns:a14="http://schemas.microsoft.com/office/drawing/2010/main">
                 <a:effectLst>
                   <a:outerShdw blurRad="63500" dist="38099" dir="2700000" algn="ctr" rotWithShape="0">
@@ -8613,7 +8613,7 @@
   <p:clrMapOvr>
     <a:masterClrMapping/>
   </p:clrMapOvr>
-  <p:transition xmlns:p14="http://schemas.microsoft.com/office/powerpoint/2010/main"/>
+  <p:transition/>
 </p:sldLayout>
 </file>
 
@@ -8923,7 +8923,7 @@
   <p:clrMapOvr>
     <a:masterClrMapping/>
   </p:clrMapOvr>
-  <p:transition xmlns:p14="http://schemas.microsoft.com/office/powerpoint/2010/main"/>
+  <p:transition/>
 </p:sldLayout>
 </file>
 
@@ -9070,7 +9070,7 @@
   <p:clrMapOvr>
     <a:masterClrMapping/>
   </p:clrMapOvr>
-  <p:transition xmlns:p14="http://schemas.microsoft.com/office/powerpoint/2010/main"/>
+  <p:transition/>
 </p:sldLayout>
 </file>
 
@@ -9247,7 +9247,7 @@
   <p:clrMapOvr>
     <a:masterClrMapping/>
   </p:clrMapOvr>
-  <p:transition xmlns:p14="http://schemas.microsoft.com/office/powerpoint/2010/main"/>
+  <p:transition/>
 </p:sldLayout>
 </file>
 
@@ -9323,7 +9323,7 @@
   <p:clrMapOvr>
     <a:masterClrMapping/>
   </p:clrMapOvr>
-  <p:transition xmlns:p14="http://schemas.microsoft.com/office/powerpoint/2010/main"/>
+  <p:transition/>
 </p:sldLayout>
 </file>
 
@@ -9590,7 +9590,7 @@
   <p:clrMapOvr>
     <a:masterClrMapping/>
   </p:clrMapOvr>
-  <p:transition xmlns:p14="http://schemas.microsoft.com/office/powerpoint/2010/main"/>
+  <p:transition/>
 </p:sldLayout>
 </file>
 
@@ -9859,7 +9859,7 @@
   <p:clrMapOvr>
     <a:masterClrMapping/>
   </p:clrMapOvr>
-  <p:transition xmlns:p14="http://schemas.microsoft.com/office/powerpoint/2010/main"/>
+  <p:transition/>
 </p:sldLayout>
 </file>
 
@@ -9906,7 +9906,7 @@
             <a:tailEnd/>
           </a:ln>
           <a:extLst>
-            <a:ext uri="{909E8E84-426E-40dd-AFC4-6F175D3DCCD1}">
+            <a:ext uri="{909E8E84-426E-40DD-AFC4-6F175D3DCCD1}">
               <a14:hiddenFill xmlns:a14="http://schemas.microsoft.com/office/drawing/2010/main">
                 <a:noFill/>
               </a14:hiddenFill>
@@ -9947,7 +9947,7 @@
             <a:tailEnd/>
           </a:ln>
           <a:extLst>
-            <a:ext uri="{909E8E84-426E-40dd-AFC4-6F175D3DCCD1}">
+            <a:ext uri="{909E8E84-426E-40DD-AFC4-6F175D3DCCD1}">
               <a14:hiddenFill xmlns:a14="http://schemas.microsoft.com/office/drawing/2010/main">
                 <a:noFill/>
               </a14:hiddenFill>
@@ -10175,7 +10175,7 @@
   <p:clrMapOvr>
     <a:masterClrMapping/>
   </p:clrMapOvr>
-  <p:transition xmlns:p14="http://schemas.microsoft.com/office/powerpoint/2010/main"/>
+  <p:transition/>
 </p:sldLayout>
 </file>
 
@@ -10222,7 +10222,7 @@
             <a:tailEnd/>
           </a:ln>
           <a:extLst>
-            <a:ext uri="{909E8E84-426E-40dd-AFC4-6F175D3DCCD1}">
+            <a:ext uri="{909E8E84-426E-40DD-AFC4-6F175D3DCCD1}">
               <a14:hiddenFill xmlns:a14="http://schemas.microsoft.com/office/drawing/2010/main">
                 <a:noFill/>
               </a14:hiddenFill>
@@ -10263,7 +10263,7 @@
             <a:tailEnd/>
           </a:ln>
           <a:extLst>
-            <a:ext uri="{909E8E84-426E-40dd-AFC4-6F175D3DCCD1}">
+            <a:ext uri="{909E8E84-426E-40DD-AFC4-6F175D3DCCD1}">
               <a14:hiddenFill xmlns:a14="http://schemas.microsoft.com/office/drawing/2010/main">
                 <a:noFill/>
               </a14:hiddenFill>
@@ -10312,14 +10312,14 @@
             <a:noFill/>
           </a:ln>
           <a:extLst>
-            <a:ext uri="{909E8E84-426E-40dd-AFC4-6F175D3DCCD1}">
+            <a:ext uri="{909E8E84-426E-40DD-AFC4-6F175D3DCCD1}">
               <a14:hiddenFill xmlns:a14="http://schemas.microsoft.com/office/drawing/2010/main">
                 <a:solidFill>
                   <a:srgbClr val="FFFFFF"/>
                 </a:solidFill>
               </a14:hiddenFill>
             </a:ext>
-            <a:ext uri="{91240B29-F687-4f45-9708-019B960494DF}">
+            <a:ext uri="{91240B29-F687-4F45-9708-019B960494DF}">
               <a14:hiddenLine xmlns:a14="http://schemas.microsoft.com/office/drawing/2010/main" w="9525">
                 <a:solidFill>
                   <a:srgbClr val="000000"/>
@@ -10518,7 +10518,7 @@
   <p:clrMapOvr>
     <a:masterClrMapping/>
   </p:clrMapOvr>
-  <p:transition xmlns:p14="http://schemas.microsoft.com/office/powerpoint/2010/main"/>
+  <p:transition/>
 </p:sldLayout>
 </file>
 
@@ -10573,14 +10573,14 @@
             <a:noFill/>
           </a:ln>
           <a:extLst>
-            <a:ext uri="{909E8E84-426E-40dd-AFC4-6F175D3DCCD1}">
+            <a:ext uri="{909E8E84-426E-40DD-AFC4-6F175D3DCCD1}">
               <a14:hiddenFill xmlns:a14="http://schemas.microsoft.com/office/drawing/2010/main">
                 <a:solidFill>
                   <a:srgbClr val="FFFFFF"/>
                 </a:solidFill>
               </a14:hiddenFill>
             </a:ext>
-            <a:ext uri="{91240B29-F687-4f45-9708-019B960494DF}">
+            <a:ext uri="{91240B29-F687-4F45-9708-019B960494DF}">
               <a14:hiddenLine xmlns:a14="http://schemas.microsoft.com/office/drawing/2010/main" w="9525">
                 <a:solidFill>
                   <a:srgbClr val="000000"/>
@@ -10619,7 +10619,7 @@
             <a:tailEnd/>
           </a:ln>
           <a:extLst>
-            <a:ext uri="{909E8E84-426E-40dd-AFC4-6F175D3DCCD1}">
+            <a:ext uri="{909E8E84-426E-40DD-AFC4-6F175D3DCCD1}">
               <a14:hiddenFill xmlns:a14="http://schemas.microsoft.com/office/drawing/2010/main">
                 <a:noFill/>
               </a14:hiddenFill>
@@ -10660,7 +10660,7 @@
             <a:tailEnd/>
           </a:ln>
           <a:extLst>
-            <a:ext uri="{909E8E84-426E-40dd-AFC4-6F175D3DCCD1}">
+            <a:ext uri="{909E8E84-426E-40DD-AFC4-6F175D3DCCD1}">
               <a14:hiddenFill xmlns:a14="http://schemas.microsoft.com/office/drawing/2010/main">
                 <a:noFill/>
               </a14:hiddenFill>
@@ -10861,7 +10861,7 @@
   <p:clrMapOvr>
     <a:masterClrMapping/>
   </p:clrMapOvr>
-  <p:transition xmlns:p14="http://schemas.microsoft.com/office/powerpoint/2010/main"/>
+  <p:transition/>
 </p:sldLayout>
 </file>
 
@@ -10916,14 +10916,14 @@
             <a:noFill/>
           </a:ln>
           <a:extLst>
-            <a:ext uri="{909E8E84-426E-40dd-AFC4-6F175D3DCCD1}">
+            <a:ext uri="{909E8E84-426E-40DD-AFC4-6F175D3DCCD1}">
               <a14:hiddenFill xmlns:a14="http://schemas.microsoft.com/office/drawing/2010/main">
                 <a:solidFill>
                   <a:srgbClr val="FFFFFF"/>
                 </a:solidFill>
               </a14:hiddenFill>
             </a:ext>
-            <a:ext uri="{91240B29-F687-4f45-9708-019B960494DF}">
+            <a:ext uri="{91240B29-F687-4F45-9708-019B960494DF}">
               <a14:hiddenLine xmlns:a14="http://schemas.microsoft.com/office/drawing/2010/main" w="9525">
                 <a:solidFill>
                   <a:srgbClr val="000000"/>
@@ -10962,7 +10962,7 @@
             <a:tailEnd/>
           </a:ln>
           <a:extLst>
-            <a:ext uri="{909E8E84-426E-40dd-AFC4-6F175D3DCCD1}">
+            <a:ext uri="{909E8E84-426E-40DD-AFC4-6F175D3DCCD1}">
               <a14:hiddenFill xmlns:a14="http://schemas.microsoft.com/office/drawing/2010/main">
                 <a:noFill/>
               </a14:hiddenFill>
@@ -11003,7 +11003,7 @@
             <a:tailEnd/>
           </a:ln>
           <a:extLst>
-            <a:ext uri="{909E8E84-426E-40dd-AFC4-6F175D3DCCD1}">
+            <a:ext uri="{909E8E84-426E-40DD-AFC4-6F175D3DCCD1}">
               <a14:hiddenFill xmlns:a14="http://schemas.microsoft.com/office/drawing/2010/main">
                 <a:noFill/>
               </a14:hiddenFill>
@@ -11204,7 +11204,7 @@
   <p:clrMapOvr>
     <a:masterClrMapping/>
   </p:clrMapOvr>
-  <p:transition xmlns:p14="http://schemas.microsoft.com/office/powerpoint/2010/main"/>
+  <p:transition/>
 </p:sldLayout>
 </file>
 
@@ -11259,14 +11259,14 @@
             <a:noFill/>
           </a:ln>
           <a:extLst>
-            <a:ext uri="{909E8E84-426E-40dd-AFC4-6F175D3DCCD1}">
+            <a:ext uri="{909E8E84-426E-40DD-AFC4-6F175D3DCCD1}">
               <a14:hiddenFill xmlns:a14="http://schemas.microsoft.com/office/drawing/2010/main">
                 <a:solidFill>
                   <a:srgbClr val="FFFFFF"/>
                 </a:solidFill>
               </a14:hiddenFill>
             </a:ext>
-            <a:ext uri="{91240B29-F687-4f45-9708-019B960494DF}">
+            <a:ext uri="{91240B29-F687-4F45-9708-019B960494DF}">
               <a14:hiddenLine xmlns:a14="http://schemas.microsoft.com/office/drawing/2010/main" w="9525">
                 <a:solidFill>
                   <a:srgbClr val="000000"/>
@@ -11305,7 +11305,7 @@
             <a:tailEnd/>
           </a:ln>
           <a:extLst>
-            <a:ext uri="{909E8E84-426E-40dd-AFC4-6F175D3DCCD1}">
+            <a:ext uri="{909E8E84-426E-40DD-AFC4-6F175D3DCCD1}">
               <a14:hiddenFill xmlns:a14="http://schemas.microsoft.com/office/drawing/2010/main">
                 <a:noFill/>
               </a14:hiddenFill>
@@ -11346,7 +11346,7 @@
             <a:tailEnd/>
           </a:ln>
           <a:extLst>
-            <a:ext uri="{909E8E84-426E-40dd-AFC4-6F175D3DCCD1}">
+            <a:ext uri="{909E8E84-426E-40DD-AFC4-6F175D3DCCD1}">
               <a14:hiddenFill xmlns:a14="http://schemas.microsoft.com/office/drawing/2010/main">
                 <a:noFill/>
               </a14:hiddenFill>
@@ -11691,7 +11691,7 @@
   <p:clrMapOvr>
     <a:masterClrMapping/>
   </p:clrMapOvr>
-  <p:transition xmlns:p14="http://schemas.microsoft.com/office/powerpoint/2010/main"/>
+  <p:transition/>
 </p:sldLayout>
 </file>
 
@@ -11746,7 +11746,7 @@
             <a:tailEnd/>
           </a:ln>
           <a:extLst>
-            <a:ext uri="{909E8E84-426E-40dd-AFC4-6F175D3DCCD1}">
+            <a:ext uri="{909E8E84-426E-40DD-AFC4-6F175D3DCCD1}">
               <a14:hiddenFill xmlns:a14="http://schemas.microsoft.com/office/drawing/2010/main">
                 <a:noFill/>
               </a14:hiddenFill>
@@ -11787,7 +11787,7 @@
             <a:tailEnd/>
           </a:ln>
           <a:extLst>
-            <a:ext uri="{909E8E84-426E-40dd-AFC4-6F175D3DCCD1}">
+            <a:ext uri="{909E8E84-426E-40DD-AFC4-6F175D3DCCD1}">
               <a14:hiddenFill xmlns:a14="http://schemas.microsoft.com/office/drawing/2010/main">
                 <a:noFill/>
               </a14:hiddenFill>
@@ -11809,7 +11809,7 @@
     <p:sldLayoutId id="2147484107" r:id="rId1"/>
     <p:sldLayoutId id="2147484108" r:id="rId2"/>
   </p:sldLayoutIdLst>
-  <p:transition xmlns:p14="http://schemas.microsoft.com/office/powerpoint/2010/main"/>
+  <p:transition/>
   <p:txStyles>
     <p:titleStyle>
       <a:lvl1pPr algn="l" rtl="0" eaLnBrk="1" fontAlgn="base" hangingPunct="1">
@@ -12347,14 +12347,14 @@
           </a:ln>
           <a:effectLst/>
           <a:extLst>
-            <a:ext uri="{909E8E84-426E-40dd-AFC4-6F175D3DCCD1}">
+            <a:ext uri="{909E8E84-426E-40DD-AFC4-6F175D3DCCD1}">
               <a14:hiddenFill xmlns:a14="http://schemas.microsoft.com/office/drawing/2010/main">
                 <a:solidFill>
                   <a:srgbClr val="FFFFFF"/>
                 </a:solidFill>
               </a14:hiddenFill>
             </a:ext>
-            <a:ext uri="{91240B29-F687-4f45-9708-019B960494DF}">
+            <a:ext uri="{91240B29-F687-4F45-9708-019B960494DF}">
               <a14:hiddenLine xmlns:a14="http://schemas.microsoft.com/office/drawing/2010/main" w="12700">
                 <a:solidFill>
                   <a:schemeClr val="tx1"/>
@@ -12364,7 +12364,7 @@
                 <a:tailEnd/>
               </a14:hiddenLine>
             </a:ext>
-            <a:ext uri="{AF507438-7753-43e0-B8FC-AC1667EBCBE1}">
+            <a:ext uri="{AF507438-7753-43E0-B8FC-AC1667EBCBE1}">
               <a14:hiddenEffects xmlns:a14="http://schemas.microsoft.com/office/drawing/2010/main">
                 <a:effectLst>
                   <a:outerShdw blurRad="63500" dist="38099" dir="2700000" algn="ctr" rotWithShape="0">
@@ -12536,7 +12536,7 @@
             <a:tailEnd/>
           </a:ln>
           <a:extLst>
-            <a:ext uri="{909E8E84-426E-40dd-AFC4-6F175D3DCCD1}">
+            <a:ext uri="{909E8E84-426E-40DD-AFC4-6F175D3DCCD1}">
               <a14:hiddenFill xmlns:a14="http://schemas.microsoft.com/office/drawing/2010/main">
                 <a:noFill/>
               </a14:hiddenFill>
@@ -12577,7 +12577,7 @@
             <a:tailEnd/>
           </a:ln>
           <a:extLst>
-            <a:ext uri="{909E8E84-426E-40dd-AFC4-6F175D3DCCD1}">
+            <a:ext uri="{909E8E84-426E-40DD-AFC4-6F175D3DCCD1}">
               <a14:hiddenFill xmlns:a14="http://schemas.microsoft.com/office/drawing/2010/main">
                 <a:noFill/>
               </a14:hiddenFill>
@@ -12610,7 +12610,7 @@
     <p:sldLayoutId id="2147484105" r:id="rId12"/>
     <p:sldLayoutId id="2147484106" r:id="rId13"/>
   </p:sldLayoutIdLst>
-  <p:transition xmlns:p14="http://schemas.microsoft.com/office/powerpoint/2010/main"/>
+  <p:transition/>
   <p:hf hdr="0" ftr="0" dt="0"/>
   <p:txStyles>
     <p:titleStyle>
@@ -13152,14 +13152,14 @@
           </a:ln>
           <a:effectLst/>
           <a:extLst>
-            <a:ext uri="{909E8E84-426E-40dd-AFC4-6F175D3DCCD1}">
+            <a:ext uri="{909E8E84-426E-40DD-AFC4-6F175D3DCCD1}">
               <a14:hiddenFill xmlns:a14="http://schemas.microsoft.com/office/drawing/2010/main">
                 <a:solidFill>
                   <a:srgbClr val="FFFFFF"/>
                 </a:solidFill>
               </a14:hiddenFill>
             </a:ext>
-            <a:ext uri="{91240B29-F687-4f45-9708-019B960494DF}">
+            <a:ext uri="{91240B29-F687-4F45-9708-019B960494DF}">
               <a14:hiddenLine xmlns:a14="http://schemas.microsoft.com/office/drawing/2010/main" w="12700">
                 <a:solidFill>
                   <a:schemeClr val="tx1"/>
@@ -13169,7 +13169,7 @@
                 <a:tailEnd/>
               </a14:hiddenLine>
             </a:ext>
-            <a:ext uri="{AF507438-7753-43e0-B8FC-AC1667EBCBE1}">
+            <a:ext uri="{AF507438-7753-43E0-B8FC-AC1667EBCBE1}">
               <a14:hiddenEffects xmlns:a14="http://schemas.microsoft.com/office/drawing/2010/main">
                 <a:effectLst>
                   <a:outerShdw blurRad="63500" dist="38099" dir="2700000" algn="ctr" rotWithShape="0">
@@ -13351,7 +13351,7 @@
             <a:tailEnd/>
           </a:ln>
           <a:extLst>
-            <a:ext uri="{909E8E84-426E-40dd-AFC4-6F175D3DCCD1}">
+            <a:ext uri="{909E8E84-426E-40DD-AFC4-6F175D3DCCD1}">
               <a14:hiddenFill xmlns:a14="http://schemas.microsoft.com/office/drawing/2010/main">
                 <a:noFill/>
               </a14:hiddenFill>
@@ -13392,7 +13392,7 @@
             <a:tailEnd/>
           </a:ln>
           <a:extLst>
-            <a:ext uri="{909E8E84-426E-40dd-AFC4-6F175D3DCCD1}">
+            <a:ext uri="{909E8E84-426E-40DD-AFC4-6F175D3DCCD1}">
               <a14:hiddenFill xmlns:a14="http://schemas.microsoft.com/office/drawing/2010/main">
                 <a:noFill/>
               </a14:hiddenFill>
@@ -13430,7 +13430,7 @@
     <p:sldLayoutId id="2147484128" r:id="rId12"/>
     <p:sldLayoutId id="2147484129" r:id="rId13"/>
   </p:sldLayoutIdLst>
-  <p:transition xmlns:p14="http://schemas.microsoft.com/office/powerpoint/2010/main"/>
+  <p:transition/>
   <p:hf hdr="0" ftr="0" dt="0"/>
   <p:txStyles>
     <p:titleStyle>
@@ -13983,11 +13983,11 @@
   <p:clrMapOvr>
     <a:masterClrMapping/>
   </p:clrMapOvr>
-  <p:transition xmlns:p14="http://schemas.microsoft.com/office/powerpoint/2010/main"/>
+  <p:transition/>
   <p:timing>
     <p:tnLst>
       <p:par>
-        <p:cTn xmlns:p14="http://schemas.microsoft.com/office/powerpoint/2010/main" id="1" dur="indefinite" restart="never" nodeType="tmRoot"/>
+        <p:cTn id="1" dur="indefinite" restart="never" nodeType="tmRoot"/>
       </p:par>
     </p:tnLst>
   </p:timing>
@@ -14027,14 +14027,14 @@
             <a:ext cx="8429625" cy="3695700"/>
           </a:xfrm>
           <a:extLst>
-            <a:ext uri="{909E8E84-426E-40dd-AFC4-6F175D3DCCD1}">
+            <a:ext uri="{909E8E84-426E-40DD-AFC4-6F175D3DCCD1}">
               <a14:hiddenFill xmlns:a14="http://schemas.microsoft.com/office/drawing/2010/main">
                 <a:solidFill>
                   <a:srgbClr val="FFFFFF"/>
                 </a:solidFill>
               </a14:hiddenFill>
             </a:ext>
-            <a:ext uri="{91240B29-F687-4f45-9708-019B960494DF}">
+            <a:ext uri="{91240B29-F687-4F45-9708-019B960494DF}">
               <a14:hiddenLine xmlns:a14="http://schemas.microsoft.com/office/drawing/2010/main" w="9525">
                 <a:solidFill>
                   <a:srgbClr val="000000"/>
@@ -14045,7 +14045,7 @@
               </a14:hiddenLine>
             </a:ext>
             <a:ext uri="{FAA26D3D-D897-4be2-8F04-BA451C77F1D7}">
-              <ma14:placeholderFlag xmlns:ma14="http://schemas.microsoft.com/office/mac/drawingml/2011/main" val="1"/>
+              <ma14:placeholderFlag xmlns:ma14="http://schemas.microsoft.com/office/mac/drawingml/2011/main" xmlns="" val="1"/>
             </a:ext>
           </a:extLst>
         </p:spPr>
@@ -14235,11 +14235,11 @@
   <p:clrMapOvr>
     <a:masterClrMapping/>
   </p:clrMapOvr>
-  <p:transition xmlns:p14="http://schemas.microsoft.com/office/powerpoint/2010/main"/>
+  <p:transition/>
   <p:timing>
     <p:tnLst>
       <p:par>
-        <p:cTn xmlns:p14="http://schemas.microsoft.com/office/powerpoint/2010/main" id="1" dur="indefinite" restart="never" nodeType="tmRoot"/>
+        <p:cTn id="1" dur="indefinite" restart="never" nodeType="tmRoot"/>
       </p:par>
     </p:tnLst>
   </p:timing>
@@ -14279,14 +14279,14 @@
             <a:ext cx="8429625" cy="3695700"/>
           </a:xfrm>
           <a:extLst>
-            <a:ext uri="{909E8E84-426E-40dd-AFC4-6F175D3DCCD1}">
+            <a:ext uri="{909E8E84-426E-40DD-AFC4-6F175D3DCCD1}">
               <a14:hiddenFill xmlns:a14="http://schemas.microsoft.com/office/drawing/2010/main">
                 <a:solidFill>
                   <a:srgbClr val="FFFFFF"/>
                 </a:solidFill>
               </a14:hiddenFill>
             </a:ext>
-            <a:ext uri="{91240B29-F687-4f45-9708-019B960494DF}">
+            <a:ext uri="{91240B29-F687-4F45-9708-019B960494DF}">
               <a14:hiddenLine xmlns:a14="http://schemas.microsoft.com/office/drawing/2010/main" w="9525">
                 <a:solidFill>
                   <a:srgbClr val="000000"/>
@@ -14297,7 +14297,7 @@
               </a14:hiddenLine>
             </a:ext>
             <a:ext uri="{FAA26D3D-D897-4be2-8F04-BA451C77F1D7}">
-              <ma14:placeholderFlag xmlns:ma14="http://schemas.microsoft.com/office/mac/drawingml/2011/main" val="1"/>
+              <ma14:placeholderFlag xmlns:ma14="http://schemas.microsoft.com/office/mac/drawingml/2011/main" xmlns="" val="1"/>
             </a:ext>
           </a:extLst>
         </p:spPr>
@@ -14481,11 +14481,11 @@
   <p:clrMapOvr>
     <a:masterClrMapping/>
   </p:clrMapOvr>
-  <p:transition xmlns:p14="http://schemas.microsoft.com/office/powerpoint/2010/main"/>
+  <p:transition/>
   <p:timing>
     <p:tnLst>
       <p:par>
-        <p:cTn xmlns:p14="http://schemas.microsoft.com/office/powerpoint/2010/main" id="1" dur="indefinite" restart="never" nodeType="tmRoot"/>
+        <p:cTn id="1" dur="indefinite" restart="never" nodeType="tmRoot"/>
       </p:par>
     </p:tnLst>
   </p:timing>
@@ -14525,14 +14525,14 @@
             <a:ext cx="8429625" cy="3695700"/>
           </a:xfrm>
           <a:extLst>
-            <a:ext uri="{909E8E84-426E-40dd-AFC4-6F175D3DCCD1}">
+            <a:ext uri="{909E8E84-426E-40DD-AFC4-6F175D3DCCD1}">
               <a14:hiddenFill xmlns:a14="http://schemas.microsoft.com/office/drawing/2010/main">
                 <a:solidFill>
                   <a:srgbClr val="FFFFFF"/>
                 </a:solidFill>
               </a14:hiddenFill>
             </a:ext>
-            <a:ext uri="{91240B29-F687-4f45-9708-019B960494DF}">
+            <a:ext uri="{91240B29-F687-4F45-9708-019B960494DF}">
               <a14:hiddenLine xmlns:a14="http://schemas.microsoft.com/office/drawing/2010/main" w="9525">
                 <a:solidFill>
                   <a:srgbClr val="000000"/>
@@ -14543,7 +14543,7 @@
               </a14:hiddenLine>
             </a:ext>
             <a:ext uri="{FAA26D3D-D897-4be2-8F04-BA451C77F1D7}">
-              <ma14:placeholderFlag xmlns:ma14="http://schemas.microsoft.com/office/mac/drawingml/2011/main" val="1"/>
+              <ma14:placeholderFlag xmlns:ma14="http://schemas.microsoft.com/office/mac/drawingml/2011/main" xmlns="" val="1"/>
             </a:ext>
           </a:extLst>
         </p:spPr>
@@ -14727,11 +14727,11 @@
   <p:clrMapOvr>
     <a:masterClrMapping/>
   </p:clrMapOvr>
-  <p:transition xmlns:p14="http://schemas.microsoft.com/office/powerpoint/2010/main"/>
+  <p:transition/>
   <p:timing>
     <p:tnLst>
       <p:par>
-        <p:cTn xmlns:p14="http://schemas.microsoft.com/office/powerpoint/2010/main" id="1" dur="indefinite" restart="never" nodeType="tmRoot"/>
+        <p:cTn id="1" dur="indefinite" restart="never" nodeType="tmRoot"/>
       </p:par>
     </p:tnLst>
   </p:timing>
@@ -14771,14 +14771,14 @@
             <a:ext cx="8429625" cy="3695700"/>
           </a:xfrm>
           <a:extLst>
-            <a:ext uri="{909E8E84-426E-40dd-AFC4-6F175D3DCCD1}">
+            <a:ext uri="{909E8E84-426E-40DD-AFC4-6F175D3DCCD1}">
               <a14:hiddenFill xmlns:a14="http://schemas.microsoft.com/office/drawing/2010/main">
                 <a:solidFill>
                   <a:srgbClr val="FFFFFF"/>
                 </a:solidFill>
               </a14:hiddenFill>
             </a:ext>
-            <a:ext uri="{91240B29-F687-4f45-9708-019B960494DF}">
+            <a:ext uri="{91240B29-F687-4F45-9708-019B960494DF}">
               <a14:hiddenLine xmlns:a14="http://schemas.microsoft.com/office/drawing/2010/main" w="9525">
                 <a:solidFill>
                   <a:srgbClr val="000000"/>
@@ -14789,7 +14789,7 @@
               </a14:hiddenLine>
             </a:ext>
             <a:ext uri="{FAA26D3D-D897-4be2-8F04-BA451C77F1D7}">
-              <ma14:placeholderFlag xmlns:ma14="http://schemas.microsoft.com/office/mac/drawingml/2011/main" val="1"/>
+              <ma14:placeholderFlag xmlns:ma14="http://schemas.microsoft.com/office/mac/drawingml/2011/main" xmlns="" val="1"/>
             </a:ext>
           </a:extLst>
         </p:spPr>
@@ -14979,11 +14979,11 @@
   <p:clrMapOvr>
     <a:masterClrMapping/>
   </p:clrMapOvr>
-  <p:transition xmlns:p14="http://schemas.microsoft.com/office/powerpoint/2010/main"/>
+  <p:transition/>
   <p:timing>
     <p:tnLst>
       <p:par>
-        <p:cTn xmlns:p14="http://schemas.microsoft.com/office/powerpoint/2010/main" id="1" dur="indefinite" restart="never" nodeType="tmRoot"/>
+        <p:cTn id="1" dur="indefinite" restart="never" nodeType="tmRoot"/>
       </p:par>
     </p:tnLst>
   </p:timing>
@@ -15023,14 +15023,14 @@
             <a:ext cx="8429625" cy="3695700"/>
           </a:xfrm>
           <a:extLst>
-            <a:ext uri="{909E8E84-426E-40dd-AFC4-6F175D3DCCD1}">
+            <a:ext uri="{909E8E84-426E-40DD-AFC4-6F175D3DCCD1}">
               <a14:hiddenFill xmlns:a14="http://schemas.microsoft.com/office/drawing/2010/main">
                 <a:solidFill>
                   <a:srgbClr val="FFFFFF"/>
                 </a:solidFill>
               </a14:hiddenFill>
             </a:ext>
-            <a:ext uri="{91240B29-F687-4f45-9708-019B960494DF}">
+            <a:ext uri="{91240B29-F687-4F45-9708-019B960494DF}">
               <a14:hiddenLine xmlns:a14="http://schemas.microsoft.com/office/drawing/2010/main" w="9525">
                 <a:solidFill>
                   <a:srgbClr val="000000"/>
@@ -15041,7 +15041,7 @@
               </a14:hiddenLine>
             </a:ext>
             <a:ext uri="{FAA26D3D-D897-4be2-8F04-BA451C77F1D7}">
-              <ma14:placeholderFlag xmlns:ma14="http://schemas.microsoft.com/office/mac/drawingml/2011/main" val="1"/>
+              <ma14:placeholderFlag xmlns:ma14="http://schemas.microsoft.com/office/mac/drawingml/2011/main" xmlns="" val="1"/>
             </a:ext>
           </a:extLst>
         </p:spPr>
@@ -15261,11 +15261,11 @@
   <p:clrMapOvr>
     <a:masterClrMapping/>
   </p:clrMapOvr>
-  <p:transition xmlns:p14="http://schemas.microsoft.com/office/powerpoint/2010/main"/>
+  <p:transition/>
   <p:timing>
     <p:tnLst>
       <p:par>
-        <p:cTn xmlns:p14="http://schemas.microsoft.com/office/powerpoint/2010/main" id="1" dur="indefinite" restart="never" nodeType="tmRoot"/>
+        <p:cTn id="1" dur="indefinite" restart="never" nodeType="tmRoot"/>
       </p:par>
     </p:tnLst>
   </p:timing>
@@ -15305,14 +15305,14 @@
             <a:ext cx="8429625" cy="3695700"/>
           </a:xfrm>
           <a:extLst>
-            <a:ext uri="{909E8E84-426E-40dd-AFC4-6F175D3DCCD1}">
+            <a:ext uri="{909E8E84-426E-40DD-AFC4-6F175D3DCCD1}">
               <a14:hiddenFill xmlns:a14="http://schemas.microsoft.com/office/drawing/2010/main">
                 <a:solidFill>
                   <a:srgbClr val="FFFFFF"/>
                 </a:solidFill>
               </a14:hiddenFill>
             </a:ext>
-            <a:ext uri="{91240B29-F687-4f45-9708-019B960494DF}">
+            <a:ext uri="{91240B29-F687-4F45-9708-019B960494DF}">
               <a14:hiddenLine xmlns:a14="http://schemas.microsoft.com/office/drawing/2010/main" w="9525">
                 <a:solidFill>
                   <a:srgbClr val="000000"/>
@@ -15323,7 +15323,7 @@
               </a14:hiddenLine>
             </a:ext>
             <a:ext uri="{FAA26D3D-D897-4be2-8F04-BA451C77F1D7}">
-              <ma14:placeholderFlag xmlns:ma14="http://schemas.microsoft.com/office/mac/drawingml/2011/main" val="1"/>
+              <ma14:placeholderFlag xmlns:ma14="http://schemas.microsoft.com/office/mac/drawingml/2011/main" xmlns="" val="1"/>
             </a:ext>
           </a:extLst>
         </p:spPr>
@@ -15461,11 +15461,11 @@
   <p:clrMapOvr>
     <a:masterClrMapping/>
   </p:clrMapOvr>
-  <p:transition xmlns:p14="http://schemas.microsoft.com/office/powerpoint/2010/main"/>
+  <p:transition/>
   <p:timing>
     <p:tnLst>
       <p:par>
-        <p:cTn xmlns:p14="http://schemas.microsoft.com/office/powerpoint/2010/main" id="1" dur="indefinite" restart="never" nodeType="tmRoot"/>
+        <p:cTn id="1" dur="indefinite" restart="never" nodeType="tmRoot"/>
       </p:par>
     </p:tnLst>
   </p:timing>
@@ -15586,11 +15586,11 @@
   <p:clrMapOvr>
     <a:masterClrMapping/>
   </p:clrMapOvr>
-  <p:transition xmlns:p14="http://schemas.microsoft.com/office/powerpoint/2010/main"/>
+  <p:transition/>
   <p:timing>
     <p:tnLst>
       <p:par>
-        <p:cTn xmlns:p14="http://schemas.microsoft.com/office/powerpoint/2010/main" id="1" dur="indefinite" restart="never" nodeType="tmRoot"/>
+        <p:cTn id="1" dur="indefinite" restart="never" nodeType="tmRoot"/>
       </p:par>
     </p:tnLst>
   </p:timing>
@@ -15630,14 +15630,14 @@
             <a:ext cx="8429625" cy="3695700"/>
           </a:xfrm>
           <a:extLst>
-            <a:ext uri="{909E8E84-426E-40dd-AFC4-6F175D3DCCD1}">
+            <a:ext uri="{909E8E84-426E-40DD-AFC4-6F175D3DCCD1}">
               <a14:hiddenFill xmlns:a14="http://schemas.microsoft.com/office/drawing/2010/main">
                 <a:solidFill>
                   <a:srgbClr val="FFFFFF"/>
                 </a:solidFill>
               </a14:hiddenFill>
             </a:ext>
-            <a:ext uri="{91240B29-F687-4f45-9708-019B960494DF}">
+            <a:ext uri="{91240B29-F687-4F45-9708-019B960494DF}">
               <a14:hiddenLine xmlns:a14="http://schemas.microsoft.com/office/drawing/2010/main" w="9525">
                 <a:solidFill>
                   <a:srgbClr val="000000"/>
@@ -15648,7 +15648,7 @@
               </a14:hiddenLine>
             </a:ext>
             <a:ext uri="{FAA26D3D-D897-4be2-8F04-BA451C77F1D7}">
-              <ma14:placeholderFlag xmlns:ma14="http://schemas.microsoft.com/office/mac/drawingml/2011/main" val="1"/>
+              <ma14:placeholderFlag xmlns:ma14="http://schemas.microsoft.com/office/mac/drawingml/2011/main" xmlns="" val="1"/>
             </a:ext>
           </a:extLst>
         </p:spPr>
@@ -15857,11 +15857,11 @@
   <p:clrMapOvr>
     <a:masterClrMapping/>
   </p:clrMapOvr>
-  <p:transition xmlns:p14="http://schemas.microsoft.com/office/powerpoint/2010/main"/>
+  <p:transition/>
   <p:timing>
     <p:tnLst>
       <p:par>
-        <p:cTn xmlns:p14="http://schemas.microsoft.com/office/powerpoint/2010/main" id="1" dur="indefinite" restart="never" nodeType="tmRoot"/>
+        <p:cTn id="1" dur="indefinite" restart="never" nodeType="tmRoot"/>
       </p:par>
     </p:tnLst>
   </p:timing>
@@ -15944,11 +15944,11 @@
   <p:clrMapOvr>
     <a:masterClrMapping/>
   </p:clrMapOvr>
-  <p:transition xmlns:p14="http://schemas.microsoft.com/office/powerpoint/2010/main"/>
+  <p:transition/>
   <p:timing>
     <p:tnLst>
       <p:par>
-        <p:cTn xmlns:p14="http://schemas.microsoft.com/office/powerpoint/2010/main" id="1" dur="indefinite" restart="never" nodeType="tmRoot"/>
+        <p:cTn id="1" dur="indefinite" restart="never" nodeType="tmRoot"/>
       </p:par>
     </p:tnLst>
   </p:timing>
@@ -15988,14 +15988,14 @@
             <a:ext cx="8429625" cy="3695700"/>
           </a:xfrm>
           <a:extLst>
-            <a:ext uri="{909E8E84-426E-40dd-AFC4-6F175D3DCCD1}">
+            <a:ext uri="{909E8E84-426E-40DD-AFC4-6F175D3DCCD1}">
               <a14:hiddenFill xmlns:a14="http://schemas.microsoft.com/office/drawing/2010/main">
                 <a:solidFill>
                   <a:srgbClr val="FFFFFF"/>
                 </a:solidFill>
               </a14:hiddenFill>
             </a:ext>
-            <a:ext uri="{91240B29-F687-4f45-9708-019B960494DF}">
+            <a:ext uri="{91240B29-F687-4F45-9708-019B960494DF}">
               <a14:hiddenLine xmlns:a14="http://schemas.microsoft.com/office/drawing/2010/main" w="9525">
                 <a:solidFill>
                   <a:srgbClr val="000000"/>
@@ -16006,7 +16006,7 @@
               </a14:hiddenLine>
             </a:ext>
             <a:ext uri="{FAA26D3D-D897-4be2-8F04-BA451C77F1D7}">
-              <ma14:placeholderFlag xmlns:ma14="http://schemas.microsoft.com/office/mac/drawingml/2011/main" val="1"/>
+              <ma14:placeholderFlag xmlns:ma14="http://schemas.microsoft.com/office/mac/drawingml/2011/main" xmlns="" val="1"/>
             </a:ext>
           </a:extLst>
         </p:spPr>
@@ -16209,11 +16209,11 @@
   <p:clrMapOvr>
     <a:masterClrMapping/>
   </p:clrMapOvr>
-  <p:transition xmlns:p14="http://schemas.microsoft.com/office/powerpoint/2010/main"/>
+  <p:transition/>
   <p:timing>
     <p:tnLst>
       <p:par>
-        <p:cTn xmlns:p14="http://schemas.microsoft.com/office/powerpoint/2010/main" id="1" dur="indefinite" restart="never" nodeType="tmRoot"/>
+        <p:cTn id="1" dur="indefinite" restart="never" nodeType="tmRoot"/>
       </p:par>
     </p:tnLst>
   </p:timing>
@@ -16269,11 +16269,7 @@
             </a:br>
             <a:r>
               <a:rPr lang="en-US" sz="7500" dirty="0" smtClean="0"/>
-              <a:t>I. </a:t>
-            </a:r>
-            <a:r>
-              <a:rPr lang="en-US" sz="7500" dirty="0" smtClean="0"/>
-              <a:t>Natural Language Processing</a:t>
+              <a:t>I. Natural Language Processing</a:t>
             </a:r>
             <a:endParaRPr lang="en-US" sz="7500" dirty="0"/>
           </a:p>
@@ -16338,11 +16334,11 @@
   <p:clrMapOvr>
     <a:masterClrMapping/>
   </p:clrMapOvr>
-  <p:transition xmlns:p14="http://schemas.microsoft.com/office/powerpoint/2010/main"/>
+  <p:transition/>
   <p:timing>
     <p:tnLst>
       <p:par>
-        <p:cTn xmlns:p14="http://schemas.microsoft.com/office/powerpoint/2010/main" id="1" dur="indefinite" restart="never" nodeType="tmRoot"/>
+        <p:cTn id="1" dur="indefinite" restart="never" nodeType="tmRoot"/>
       </p:par>
     </p:tnLst>
   </p:timing>
@@ -16382,14 +16378,14 @@
             <a:ext cx="8429625" cy="3695700"/>
           </a:xfrm>
           <a:extLst>
-            <a:ext uri="{909E8E84-426E-40dd-AFC4-6F175D3DCCD1}">
+            <a:ext uri="{909E8E84-426E-40DD-AFC4-6F175D3DCCD1}">
               <a14:hiddenFill xmlns:a14="http://schemas.microsoft.com/office/drawing/2010/main">
                 <a:solidFill>
                   <a:srgbClr val="FFFFFF"/>
                 </a:solidFill>
               </a14:hiddenFill>
             </a:ext>
-            <a:ext uri="{91240B29-F687-4f45-9708-019B960494DF}">
+            <a:ext uri="{91240B29-F687-4F45-9708-019B960494DF}">
               <a14:hiddenLine xmlns:a14="http://schemas.microsoft.com/office/drawing/2010/main" w="9525">
                 <a:solidFill>
                   <a:srgbClr val="000000"/>
@@ -16400,7 +16396,7 @@
               </a14:hiddenLine>
             </a:ext>
             <a:ext uri="{FAA26D3D-D897-4be2-8F04-BA451C77F1D7}">
-              <ma14:placeholderFlag xmlns:ma14="http://schemas.microsoft.com/office/mac/drawingml/2011/main" val="1"/>
+              <ma14:placeholderFlag xmlns:ma14="http://schemas.microsoft.com/office/mac/drawingml/2011/main" xmlns="" val="1"/>
             </a:ext>
           </a:extLst>
         </p:spPr>
@@ -16447,82 +16443,127 @@
                 <a:ea typeface="ヒラギノ角ゴ ProN W6" charset="0"/>
                 <a:cs typeface="ヒラギノ角ゴ ProN W6" charset="0"/>
               </a:rPr>
-              <a:t>science, artificial intelligence, and linguistics concerned with the</a:t>
-            </a:r>
-            <a:br>
+              <a:t>science, artificial intelligence, and linguistics concerned </a:t>
+            </a:r>
+            <a:r>
+              <a:rPr lang="en-US" sz="3000" b="0" cap="none">
+                <a:latin typeface="PFDinTextCompPro-Bold" charset="0"/>
+                <a:ea typeface="ヒラギノ角ゴ ProN W6" charset="0"/>
+                <a:cs typeface="ヒラギノ角ゴ ProN W6" charset="0"/>
+              </a:rPr>
+              <a:t>with </a:t>
+            </a:r>
+            <a:r>
+              <a:rPr lang="en-US" sz="3000" b="0" cap="none" smtClean="0">
+                <a:latin typeface="PFDinTextCompPro-Bold" charset="0"/>
+                <a:ea typeface="ヒラギノ角ゴ ProN W6" charset="0"/>
+                <a:cs typeface="ヒラギノ角ゴ ProN W6" charset="0"/>
+              </a:rPr>
+              <a:t>the interactions </a:t>
+            </a:r>
+            <a:r>
               <a:rPr lang="en-US" sz="3000" b="0" cap="none" dirty="0">
                 <a:latin typeface="PFDinTextCompPro-Bold" charset="0"/>
                 <a:ea typeface="ヒラギノ角ゴ ProN W6" charset="0"/>
                 <a:cs typeface="ヒラギノ角ゴ ProN W6" charset="0"/>
               </a:rPr>
-            </a:br>
+              <a:t>between computers and human (natural) languages</a:t>
+            </a:r>
+            <a:r>
+              <a:rPr lang="en-US" sz="3000" b="0" cap="none">
+                <a:latin typeface="PFDinTextCompPro-Bold" charset="0"/>
+                <a:ea typeface="ヒラギノ角ゴ ProN W6" charset="0"/>
+                <a:cs typeface="ヒラギノ角ゴ ProN W6" charset="0"/>
+              </a:rPr>
+              <a:t>. </a:t>
+            </a:r>
+            <a:r>
+              <a:rPr lang="en-US" sz="3000" b="0" cap="none" smtClean="0">
+                <a:latin typeface="PFDinTextCompPro-Bold" charset="0"/>
+                <a:ea typeface="ヒラギノ角ゴ ProN W6" charset="0"/>
+                <a:cs typeface="ヒラギノ角ゴ ProN W6" charset="0"/>
+              </a:rPr>
+              <a:t>As such</a:t>
+            </a:r>
             <a:r>
               <a:rPr lang="en-US" sz="3000" b="0" cap="none" dirty="0">
                 <a:latin typeface="PFDinTextCompPro-Bold" charset="0"/>
                 <a:ea typeface="ヒラギノ角ゴ ProN W6" charset="0"/>
                 <a:cs typeface="ヒラギノ角ゴ ProN W6" charset="0"/>
               </a:rPr>
-              <a:t>interactions between computers and human (natural) languages. As</a:t>
-            </a:r>
-            <a:br>
+              <a:t>, NLP is related to the area of </a:t>
+            </a:r>
+            <a:r>
+              <a:rPr lang="en-US" sz="3000" b="0" cap="none">
+                <a:latin typeface="PFDinTextCompPro-Bold" charset="0"/>
+                <a:ea typeface="ヒラギノ角ゴ ProN W6" charset="0"/>
+                <a:cs typeface="ヒラギノ角ゴ ProN W6" charset="0"/>
+              </a:rPr>
+              <a:t>human–computer </a:t>
+            </a:r>
+            <a:r>
+              <a:rPr lang="en-US" sz="3000" b="0" cap="none" smtClean="0">
+                <a:latin typeface="PFDinTextCompPro-Bold" charset="0"/>
+                <a:ea typeface="ヒラギノ角ゴ ProN W6" charset="0"/>
+                <a:cs typeface="ヒラギノ角ゴ ProN W6" charset="0"/>
+              </a:rPr>
+              <a:t>interaction. Many </a:t>
+            </a:r>
+            <a:r>
               <a:rPr lang="en-US" sz="3000" b="0" cap="none" dirty="0">
                 <a:latin typeface="PFDinTextCompPro-Bold" charset="0"/>
                 <a:ea typeface="ヒラギノ角ゴ ProN W6" charset="0"/>
                 <a:cs typeface="ヒラギノ角ゴ ProN W6" charset="0"/>
               </a:rPr>
-            </a:br>
+              <a:t>challenges in NLP involve natural language </a:t>
+            </a:r>
+            <a:r>
+              <a:rPr lang="en-US" sz="3000" b="0" cap="none">
+                <a:latin typeface="PFDinTextCompPro-Bold" charset="0"/>
+                <a:ea typeface="ヒラギノ角ゴ ProN W6" charset="0"/>
+                <a:cs typeface="ヒラギノ角ゴ ProN W6" charset="0"/>
+              </a:rPr>
+              <a:t>understanding </a:t>
+            </a:r>
+            <a:r>
+              <a:rPr lang="en-US" sz="3000" b="0" cap="none" smtClean="0">
+                <a:latin typeface="PFDinTextCompPro-Bold" charset="0"/>
+                <a:ea typeface="ヒラギノ角ゴ ProN W6" charset="0"/>
+                <a:cs typeface="ヒラギノ角ゴ ProN W6" charset="0"/>
+              </a:rPr>
+              <a:t>-- that </a:t>
+            </a:r>
             <a:r>
               <a:rPr lang="en-US" sz="3000" b="0" cap="none" dirty="0">
                 <a:latin typeface="PFDinTextCompPro-Bold" charset="0"/>
                 <a:ea typeface="ヒラギノ角ゴ ProN W6" charset="0"/>
                 <a:cs typeface="ヒラギノ角ゴ ProN W6" charset="0"/>
               </a:rPr>
-              <a:t>such, NLP is related to the area of human–computer interaction.</a:t>
-            </a:r>
-            <a:br>
+              <a:t>is, enabling computers to derive meaning from </a:t>
+            </a:r>
+            <a:r>
+              <a:rPr lang="en-US" sz="3000" b="0" cap="none">
+                <a:latin typeface="PFDinTextCompPro-Bold" charset="0"/>
+                <a:ea typeface="ヒラギノ角ゴ ProN W6" charset="0"/>
+                <a:cs typeface="ヒラギノ角ゴ ProN W6" charset="0"/>
+              </a:rPr>
+              <a:t>human </a:t>
+            </a:r>
+            <a:r>
+              <a:rPr lang="en-US" sz="3000" b="0" cap="none" smtClean="0">
+                <a:latin typeface="PFDinTextCompPro-Bold" charset="0"/>
+                <a:ea typeface="ヒラギノ角ゴ ProN W6" charset="0"/>
+                <a:cs typeface="ヒラギノ角ゴ ProN W6" charset="0"/>
+              </a:rPr>
+              <a:t>or natural </a:t>
+            </a:r>
+            <a:r>
               <a:rPr lang="en-US" sz="3000" b="0" cap="none" dirty="0">
                 <a:latin typeface="PFDinTextCompPro-Bold" charset="0"/>
                 <a:ea typeface="ヒラギノ角ゴ ProN W6" charset="0"/>
                 <a:cs typeface="ヒラギノ角ゴ ProN W6" charset="0"/>
               </a:rPr>
-            </a:br>
-            <a:r>
-              <a:rPr lang="en-US" sz="3000" b="0" cap="none" dirty="0">
-                <a:latin typeface="PFDinTextCompPro-Bold" charset="0"/>
-                <a:ea typeface="ヒラギノ角ゴ ProN W6" charset="0"/>
-                <a:cs typeface="ヒラギノ角ゴ ProN W6" charset="0"/>
-              </a:rPr>
-              <a:t>Many challenges in NLP involve natural language understanding --</a:t>
-            </a:r>
-            <a:br>
-              <a:rPr lang="en-US" sz="3000" b="0" cap="none" dirty="0">
-                <a:latin typeface="PFDinTextCompPro-Bold" charset="0"/>
-                <a:ea typeface="ヒラギノ角ゴ ProN W6" charset="0"/>
-                <a:cs typeface="ヒラギノ角ゴ ProN W6" charset="0"/>
-              </a:rPr>
-            </a:br>
-            <a:r>
-              <a:rPr lang="en-US" sz="3000" b="0" cap="none" dirty="0">
-                <a:latin typeface="PFDinTextCompPro-Bold" charset="0"/>
-                <a:ea typeface="ヒラギノ角ゴ ProN W6" charset="0"/>
-                <a:cs typeface="ヒラギノ角ゴ ProN W6" charset="0"/>
-              </a:rPr>
-              <a:t>that is, enabling computers to derive meaning from human or</a:t>
-            </a:r>
-            <a:br>
-              <a:rPr lang="en-US" sz="3000" b="0" cap="none" dirty="0">
-                <a:latin typeface="PFDinTextCompPro-Bold" charset="0"/>
-                <a:ea typeface="ヒラギノ角ゴ ProN W6" charset="0"/>
-                <a:cs typeface="ヒラギノ角ゴ ProN W6" charset="0"/>
-              </a:rPr>
-            </a:br>
-            <a:r>
-              <a:rPr lang="en-US" sz="3000" b="0" cap="none" dirty="0">
-                <a:latin typeface="PFDinTextCompPro-Bold" charset="0"/>
-                <a:ea typeface="ヒラギノ角ゴ ProN W6" charset="0"/>
-                <a:cs typeface="ヒラギノ角ゴ ProN W6" charset="0"/>
-              </a:rPr>
-              <a:t>natural language input</a:t>
+              <a:t>language input</a:t>
             </a:r>
             <a:r>
               <a:rPr lang="en-US" sz="3000" b="0" cap="none" dirty="0" smtClean="0">
@@ -16633,11 +16674,11 @@
   <p:clrMapOvr>
     <a:masterClrMapping/>
   </p:clrMapOvr>
-  <p:transition xmlns:p14="http://schemas.microsoft.com/office/powerpoint/2010/main"/>
+  <p:transition/>
   <p:timing>
     <p:tnLst>
       <p:par>
-        <p:cTn xmlns:p14="http://schemas.microsoft.com/office/powerpoint/2010/main" id="1" dur="indefinite" restart="never" nodeType="tmRoot"/>
+        <p:cTn id="1" dur="indefinite" restart="never" nodeType="tmRoot"/>
       </p:par>
     </p:tnLst>
   </p:timing>
@@ -16677,14 +16718,14 @@
             <a:ext cx="8429625" cy="876300"/>
           </a:xfrm>
           <a:extLst>
-            <a:ext uri="{909E8E84-426E-40dd-AFC4-6F175D3DCCD1}">
+            <a:ext uri="{909E8E84-426E-40DD-AFC4-6F175D3DCCD1}">
               <a14:hiddenFill xmlns:a14="http://schemas.microsoft.com/office/drawing/2010/main">
                 <a:solidFill>
                   <a:srgbClr val="FFFFFF"/>
                 </a:solidFill>
               </a14:hiddenFill>
             </a:ext>
-            <a:ext uri="{91240B29-F687-4f45-9708-019B960494DF}">
+            <a:ext uri="{91240B29-F687-4F45-9708-019B960494DF}">
               <a14:hiddenLine xmlns:a14="http://schemas.microsoft.com/office/drawing/2010/main" w="9525">
                 <a:solidFill>
                   <a:srgbClr val="000000"/>
@@ -16695,7 +16736,7 @@
               </a14:hiddenLine>
             </a:ext>
             <a:ext uri="{FAA26D3D-D897-4be2-8F04-BA451C77F1D7}">
-              <ma14:placeholderFlag xmlns:ma14="http://schemas.microsoft.com/office/mac/drawingml/2011/main" val="1"/>
+              <ma14:placeholderFlag xmlns:ma14="http://schemas.microsoft.com/office/mac/drawingml/2011/main" xmlns="" val="1"/>
             </a:ext>
           </a:extLst>
         </p:spPr>
@@ -16821,14 +16862,14 @@
             <a:avLst/>
           </a:prstGeom>
           <a:extLst>
-            <a:ext uri="{909E8E84-426E-40dd-AFC4-6F175D3DCCD1}">
+            <a:ext uri="{909E8E84-426E-40DD-AFC4-6F175D3DCCD1}">
               <a14:hiddenFill xmlns:a14="http://schemas.microsoft.com/office/drawing/2010/main">
                 <a:solidFill>
                   <a:srgbClr val="FFFFFF"/>
                 </a:solidFill>
               </a14:hiddenFill>
             </a:ext>
-            <a:ext uri="{91240B29-F687-4f45-9708-019B960494DF}">
+            <a:ext uri="{91240B29-F687-4F45-9708-019B960494DF}">
               <a14:hiddenLine xmlns:a14="http://schemas.microsoft.com/office/drawing/2010/main" w="9525">
                 <a:solidFill>
                   <a:srgbClr val="000000"/>
@@ -16839,7 +16880,7 @@
               </a14:hiddenLine>
             </a:ext>
             <a:ext uri="{FAA26D3D-D897-4be2-8F04-BA451C77F1D7}">
-              <ma14:placeholderFlag xmlns:ma14="http://schemas.microsoft.com/office/mac/drawingml/2011/main" val="1"/>
+              <ma14:placeholderFlag xmlns:ma14="http://schemas.microsoft.com/office/mac/drawingml/2011/main" xmlns="" val="1"/>
             </a:ext>
           </a:extLst>
         </p:spPr>
@@ -17071,14 +17112,14 @@
             <a:avLst/>
           </a:prstGeom>
           <a:extLst>
-            <a:ext uri="{909E8E84-426E-40dd-AFC4-6F175D3DCCD1}">
+            <a:ext uri="{909E8E84-426E-40DD-AFC4-6F175D3DCCD1}">
               <a14:hiddenFill xmlns:a14="http://schemas.microsoft.com/office/drawing/2010/main">
                 <a:solidFill>
                   <a:srgbClr val="FFFFFF"/>
                 </a:solidFill>
               </a14:hiddenFill>
             </a:ext>
-            <a:ext uri="{91240B29-F687-4f45-9708-019B960494DF}">
+            <a:ext uri="{91240B29-F687-4F45-9708-019B960494DF}">
               <a14:hiddenLine xmlns:a14="http://schemas.microsoft.com/office/drawing/2010/main" w="9525">
                 <a:solidFill>
                   <a:srgbClr val="000000"/>
@@ -17089,7 +17130,7 @@
               </a14:hiddenLine>
             </a:ext>
             <a:ext uri="{FAA26D3D-D897-4be2-8F04-BA451C77F1D7}">
-              <ma14:placeholderFlag xmlns:ma14="http://schemas.microsoft.com/office/mac/drawingml/2011/main" val="1"/>
+              <ma14:placeholderFlag xmlns:ma14="http://schemas.microsoft.com/office/mac/drawingml/2011/main" xmlns="" val="1"/>
             </a:ext>
           </a:extLst>
         </p:spPr>
@@ -17343,14 +17384,14 @@
             <a:avLst/>
           </a:prstGeom>
           <a:extLst>
-            <a:ext uri="{909E8E84-426E-40dd-AFC4-6F175D3DCCD1}">
+            <a:ext uri="{909E8E84-426E-40DD-AFC4-6F175D3DCCD1}">
               <a14:hiddenFill xmlns:a14="http://schemas.microsoft.com/office/drawing/2010/main">
                 <a:solidFill>
                   <a:srgbClr val="FFFFFF"/>
                 </a:solidFill>
               </a14:hiddenFill>
             </a:ext>
-            <a:ext uri="{91240B29-F687-4f45-9708-019B960494DF}">
+            <a:ext uri="{91240B29-F687-4F45-9708-019B960494DF}">
               <a14:hiddenLine xmlns:a14="http://schemas.microsoft.com/office/drawing/2010/main" w="9525">
                 <a:solidFill>
                   <a:srgbClr val="000000"/>
@@ -17361,7 +17402,7 @@
               </a14:hiddenLine>
             </a:ext>
             <a:ext uri="{FAA26D3D-D897-4be2-8F04-BA451C77F1D7}">
-              <ma14:placeholderFlag xmlns:ma14="http://schemas.microsoft.com/office/mac/drawingml/2011/main" val="1"/>
+              <ma14:placeholderFlag xmlns:ma14="http://schemas.microsoft.com/office/mac/drawingml/2011/main" xmlns="" val="1"/>
             </a:ext>
           </a:extLst>
         </p:spPr>
@@ -17586,11 +17627,11 @@
   <p:clrMapOvr>
     <a:masterClrMapping/>
   </p:clrMapOvr>
-  <p:transition xmlns:p14="http://schemas.microsoft.com/office/powerpoint/2010/main"/>
+  <p:transition/>
   <p:timing>
     <p:tnLst>
       <p:par>
-        <p:cTn xmlns:p14="http://schemas.microsoft.com/office/powerpoint/2010/main" id="1" dur="indefinite" restart="never" nodeType="tmRoot">
+        <p:cTn id="1" dur="indefinite" restart="never" nodeType="tmRoot">
           <p:childTnLst>
             <p:seq concurrent="1" nextAc="seek">
               <p:cTn id="2" dur="indefinite" nodeType="mainSeq">
@@ -17839,14 +17880,14 @@
             <a:ext cx="8429625" cy="647700"/>
           </a:xfrm>
           <a:extLst>
-            <a:ext uri="{909E8E84-426E-40dd-AFC4-6F175D3DCCD1}">
+            <a:ext uri="{909E8E84-426E-40DD-AFC4-6F175D3DCCD1}">
               <a14:hiddenFill xmlns:a14="http://schemas.microsoft.com/office/drawing/2010/main">
                 <a:solidFill>
                   <a:srgbClr val="FFFFFF"/>
                 </a:solidFill>
               </a14:hiddenFill>
             </a:ext>
-            <a:ext uri="{91240B29-F687-4f45-9708-019B960494DF}">
+            <a:ext uri="{91240B29-F687-4F45-9708-019B960494DF}">
               <a14:hiddenLine xmlns:a14="http://schemas.microsoft.com/office/drawing/2010/main" w="9525">
                 <a:solidFill>
                   <a:srgbClr val="000000"/>
@@ -17857,7 +17898,7 @@
               </a14:hiddenLine>
             </a:ext>
             <a:ext uri="{FAA26D3D-D897-4be2-8F04-BA451C77F1D7}">
-              <ma14:placeholderFlag xmlns:ma14="http://schemas.microsoft.com/office/mac/drawingml/2011/main" val="1"/>
+              <ma14:placeholderFlag xmlns:ma14="http://schemas.microsoft.com/office/mac/drawingml/2011/main" xmlns="" val="1"/>
             </a:ext>
           </a:extLst>
         </p:spPr>
@@ -17983,14 +18024,14 @@
             <a:avLst/>
           </a:prstGeom>
           <a:extLst>
-            <a:ext uri="{909E8E84-426E-40dd-AFC4-6F175D3DCCD1}">
+            <a:ext uri="{909E8E84-426E-40DD-AFC4-6F175D3DCCD1}">
               <a14:hiddenFill xmlns:a14="http://schemas.microsoft.com/office/drawing/2010/main">
                 <a:solidFill>
                   <a:srgbClr val="FFFFFF"/>
                 </a:solidFill>
               </a14:hiddenFill>
             </a:ext>
-            <a:ext uri="{91240B29-F687-4f45-9708-019B960494DF}">
+            <a:ext uri="{91240B29-F687-4F45-9708-019B960494DF}">
               <a14:hiddenLine xmlns:a14="http://schemas.microsoft.com/office/drawing/2010/main" w="9525">
                 <a:solidFill>
                   <a:srgbClr val="000000"/>
@@ -18001,7 +18042,7 @@
               </a14:hiddenLine>
             </a:ext>
             <a:ext uri="{FAA26D3D-D897-4be2-8F04-BA451C77F1D7}">
-              <ma14:placeholderFlag xmlns:ma14="http://schemas.microsoft.com/office/mac/drawingml/2011/main" val="1"/>
+              <ma14:placeholderFlag xmlns:ma14="http://schemas.microsoft.com/office/mac/drawingml/2011/main" xmlns="" val="1"/>
             </a:ext>
           </a:extLst>
         </p:spPr>
@@ -18240,14 +18281,14 @@
             <a:avLst/>
           </a:prstGeom>
           <a:extLst>
-            <a:ext uri="{909E8E84-426E-40dd-AFC4-6F175D3DCCD1}">
+            <a:ext uri="{909E8E84-426E-40DD-AFC4-6F175D3DCCD1}">
               <a14:hiddenFill xmlns:a14="http://schemas.microsoft.com/office/drawing/2010/main">
                 <a:solidFill>
                   <a:srgbClr val="FFFFFF"/>
                 </a:solidFill>
               </a14:hiddenFill>
             </a:ext>
-            <a:ext uri="{91240B29-F687-4f45-9708-019B960494DF}">
+            <a:ext uri="{91240B29-F687-4F45-9708-019B960494DF}">
               <a14:hiddenLine xmlns:a14="http://schemas.microsoft.com/office/drawing/2010/main" w="9525">
                 <a:solidFill>
                   <a:srgbClr val="000000"/>
@@ -18258,7 +18299,7 @@
               </a14:hiddenLine>
             </a:ext>
             <a:ext uri="{FAA26D3D-D897-4be2-8F04-BA451C77F1D7}">
-              <ma14:placeholderFlag xmlns:ma14="http://schemas.microsoft.com/office/mac/drawingml/2011/main" val="1"/>
+              <ma14:placeholderFlag xmlns:ma14="http://schemas.microsoft.com/office/mac/drawingml/2011/main" xmlns="" val="1"/>
             </a:ext>
           </a:extLst>
         </p:spPr>
@@ -18497,14 +18538,14 @@
             <a:avLst/>
           </a:prstGeom>
           <a:extLst>
-            <a:ext uri="{909E8E84-426E-40dd-AFC4-6F175D3DCCD1}">
+            <a:ext uri="{909E8E84-426E-40DD-AFC4-6F175D3DCCD1}">
               <a14:hiddenFill xmlns:a14="http://schemas.microsoft.com/office/drawing/2010/main">
                 <a:solidFill>
                   <a:srgbClr val="FFFFFF"/>
                 </a:solidFill>
               </a14:hiddenFill>
             </a:ext>
-            <a:ext uri="{91240B29-F687-4f45-9708-019B960494DF}">
+            <a:ext uri="{91240B29-F687-4F45-9708-019B960494DF}">
               <a14:hiddenLine xmlns:a14="http://schemas.microsoft.com/office/drawing/2010/main" w="9525">
                 <a:solidFill>
                   <a:srgbClr val="000000"/>
@@ -18515,7 +18556,7 @@
               </a14:hiddenLine>
             </a:ext>
             <a:ext uri="{FAA26D3D-D897-4be2-8F04-BA451C77F1D7}">
-              <ma14:placeholderFlag xmlns:ma14="http://schemas.microsoft.com/office/mac/drawingml/2011/main" val="1"/>
+              <ma14:placeholderFlag xmlns:ma14="http://schemas.microsoft.com/office/mac/drawingml/2011/main" xmlns="" val="1"/>
             </a:ext>
           </a:extLst>
         </p:spPr>
@@ -18762,11 +18803,11 @@
   <p:clrMapOvr>
     <a:masterClrMapping/>
   </p:clrMapOvr>
-  <p:transition xmlns:p14="http://schemas.microsoft.com/office/powerpoint/2010/main"/>
+  <p:transition/>
   <p:timing>
     <p:tnLst>
       <p:par>
-        <p:cTn xmlns:p14="http://schemas.microsoft.com/office/powerpoint/2010/main" id="1" dur="indefinite" restart="never" nodeType="tmRoot">
+        <p:cTn id="1" dur="indefinite" restart="never" nodeType="tmRoot">
           <p:childTnLst>
             <p:seq concurrent="1" nextAc="seek">
               <p:cTn id="2" dur="indefinite" nodeType="mainSeq">
@@ -19096,11 +19137,11 @@
   <p:clrMapOvr>
     <a:masterClrMapping/>
   </p:clrMapOvr>
-  <p:transition xmlns:p14="http://schemas.microsoft.com/office/powerpoint/2010/main"/>
+  <p:transition/>
   <p:timing>
     <p:tnLst>
       <p:par>
-        <p:cTn xmlns:p14="http://schemas.microsoft.com/office/powerpoint/2010/main" id="1" dur="indefinite" restart="never" nodeType="tmRoot"/>
+        <p:cTn id="1" dur="indefinite" restart="never" nodeType="tmRoot"/>
       </p:par>
     </p:tnLst>
   </p:timing>
@@ -19140,14 +19181,14 @@
             <a:ext cx="8429625" cy="1257300"/>
           </a:xfrm>
           <a:extLst>
-            <a:ext uri="{909E8E84-426E-40dd-AFC4-6F175D3DCCD1}">
+            <a:ext uri="{909E8E84-426E-40DD-AFC4-6F175D3DCCD1}">
               <a14:hiddenFill xmlns:a14="http://schemas.microsoft.com/office/drawing/2010/main">
                 <a:solidFill>
                   <a:srgbClr val="FFFFFF"/>
                 </a:solidFill>
               </a14:hiddenFill>
             </a:ext>
-            <a:ext uri="{91240B29-F687-4f45-9708-019B960494DF}">
+            <a:ext uri="{91240B29-F687-4F45-9708-019B960494DF}">
               <a14:hiddenLine xmlns:a14="http://schemas.microsoft.com/office/drawing/2010/main" w="9525">
                 <a:solidFill>
                   <a:srgbClr val="000000"/>
@@ -19158,7 +19199,7 @@
               </a14:hiddenLine>
             </a:ext>
             <a:ext uri="{FAA26D3D-D897-4be2-8F04-BA451C77F1D7}">
-              <ma14:placeholderFlag xmlns:ma14="http://schemas.microsoft.com/office/mac/drawingml/2011/main" val="1"/>
+              <ma14:placeholderFlag xmlns:ma14="http://schemas.microsoft.com/office/mac/drawingml/2011/main" xmlns="" val="1"/>
             </a:ext>
           </a:extLst>
         </p:spPr>
@@ -19287,14 +19328,14 @@
             <a:avLst/>
           </a:prstGeom>
           <a:extLst>
-            <a:ext uri="{909E8E84-426E-40dd-AFC4-6F175D3DCCD1}">
+            <a:ext uri="{909E8E84-426E-40DD-AFC4-6F175D3DCCD1}">
               <a14:hiddenFill xmlns:a14="http://schemas.microsoft.com/office/drawing/2010/main">
                 <a:solidFill>
                   <a:srgbClr val="FFFFFF"/>
                 </a:solidFill>
               </a14:hiddenFill>
             </a:ext>
-            <a:ext uri="{91240B29-F687-4f45-9708-019B960494DF}">
+            <a:ext uri="{91240B29-F687-4F45-9708-019B960494DF}">
               <a14:hiddenLine xmlns:a14="http://schemas.microsoft.com/office/drawing/2010/main" w="9525">
                 <a:solidFill>
                   <a:srgbClr val="000000"/>
@@ -19305,7 +19346,7 @@
               </a14:hiddenLine>
             </a:ext>
             <a:ext uri="{FAA26D3D-D897-4be2-8F04-BA451C77F1D7}">
-              <ma14:placeholderFlag xmlns:ma14="http://schemas.microsoft.com/office/mac/drawingml/2011/main" val="1"/>
+              <ma14:placeholderFlag xmlns:ma14="http://schemas.microsoft.com/office/mac/drawingml/2011/main" xmlns="" val="1"/>
             </a:ext>
           </a:extLst>
         </p:spPr>
@@ -19530,11 +19571,11 @@
   <p:clrMapOvr>
     <a:masterClrMapping/>
   </p:clrMapOvr>
-  <p:transition xmlns:p14="http://schemas.microsoft.com/office/powerpoint/2010/main"/>
+  <p:transition/>
   <p:timing>
     <p:tnLst>
       <p:par>
-        <p:cTn xmlns:p14="http://schemas.microsoft.com/office/powerpoint/2010/main" id="1" dur="indefinite" restart="never" nodeType="tmRoot">
+        <p:cTn id="1" dur="indefinite" restart="never" nodeType="tmRoot">
           <p:childTnLst>
             <p:seq concurrent="1" nextAc="seek">
               <p:cTn id="2" dur="indefinite" nodeType="mainSeq">
@@ -19691,14 +19732,14 @@
             <a:ext cx="8429625" cy="3695700"/>
           </a:xfrm>
           <a:extLst>
-            <a:ext uri="{909E8E84-426E-40dd-AFC4-6F175D3DCCD1}">
+            <a:ext uri="{909E8E84-426E-40DD-AFC4-6F175D3DCCD1}">
               <a14:hiddenFill xmlns:a14="http://schemas.microsoft.com/office/drawing/2010/main">
                 <a:solidFill>
                   <a:srgbClr val="FFFFFF"/>
                 </a:solidFill>
               </a14:hiddenFill>
             </a:ext>
-            <a:ext uri="{91240B29-F687-4f45-9708-019B960494DF}">
+            <a:ext uri="{91240B29-F687-4F45-9708-019B960494DF}">
               <a14:hiddenLine xmlns:a14="http://schemas.microsoft.com/office/drawing/2010/main" w="9525">
                 <a:solidFill>
                   <a:srgbClr val="000000"/>
@@ -19709,7 +19750,7 @@
               </a14:hiddenLine>
             </a:ext>
             <a:ext uri="{FAA26D3D-D897-4be2-8F04-BA451C77F1D7}">
-              <ma14:placeholderFlag xmlns:ma14="http://schemas.microsoft.com/office/mac/drawingml/2011/main" val="1"/>
+              <ma14:placeholderFlag xmlns:ma14="http://schemas.microsoft.com/office/mac/drawingml/2011/main" xmlns="" val="1"/>
             </a:ext>
           </a:extLst>
         </p:spPr>
@@ -19899,11 +19940,11 @@
   <p:clrMapOvr>
     <a:masterClrMapping/>
   </p:clrMapOvr>
-  <p:transition xmlns:p14="http://schemas.microsoft.com/office/powerpoint/2010/main"/>
+  <p:transition/>
   <p:timing>
     <p:tnLst>
       <p:par>
-        <p:cTn xmlns:p14="http://schemas.microsoft.com/office/powerpoint/2010/main" id="1" dur="indefinite" restart="never" nodeType="tmRoot"/>
+        <p:cTn id="1" dur="indefinite" restart="never" nodeType="tmRoot"/>
       </p:par>
     </p:tnLst>
   </p:timing>
@@ -20155,7 +20196,7 @@
         </a:ln>
         <a:effectLst/>
         <a:extLst>
-          <a:ext uri="{AF507438-7753-43e0-B8FC-AC1667EBCBE1}">
+          <a:ext uri="{AF507438-7753-43E0-B8FC-AC1667EBCBE1}">
             <a14:hiddenEffects xmlns:a14="http://schemas.microsoft.com/office/drawing/2010/main">
               <a:effectLst>
                 <a:outerShdw blurRad="63500" dist="38099" dir="2700000" algn="ctr" rotWithShape="0">
@@ -20233,7 +20274,7 @@
         </a:ln>
         <a:effectLst/>
         <a:extLst>
-          <a:ext uri="{AF507438-7753-43e0-B8FC-AC1667EBCBE1}">
+          <a:ext uri="{AF507438-7753-43E0-B8FC-AC1667EBCBE1}">
             <a14:hiddenEffects xmlns:a14="http://schemas.microsoft.com/office/drawing/2010/main">
               <a:effectLst>
                 <a:outerShdw blurRad="63500" dist="38099" dir="2700000" algn="ctr" rotWithShape="0">
@@ -20575,7 +20616,7 @@
         </a:ln>
         <a:effectLst/>
         <a:extLst>
-          <a:ext uri="{AF507438-7753-43e0-B8FC-AC1667EBCBE1}">
+          <a:ext uri="{AF507438-7753-43E0-B8FC-AC1667EBCBE1}">
             <a14:hiddenEffects xmlns:a14="http://schemas.microsoft.com/office/drawing/2010/main">
               <a:effectLst>
                 <a:outerShdw blurRad="63500" dist="38099" dir="2700000" algn="ctr" rotWithShape="0">
@@ -20641,7 +20682,7 @@
         </a:ln>
         <a:effectLst/>
         <a:extLst>
-          <a:ext uri="{AF507438-7753-43e0-B8FC-AC1667EBCBE1}">
+          <a:ext uri="{AF507438-7753-43E0-B8FC-AC1667EBCBE1}">
             <a14:hiddenEffects xmlns:a14="http://schemas.microsoft.com/office/drawing/2010/main">
               <a:effectLst>
                 <a:outerShdw blurRad="63500" dist="38099" dir="2700000" algn="ctr" rotWithShape="0">
@@ -20949,7 +20990,7 @@
         </a:ln>
         <a:effectLst/>
         <a:extLst>
-          <a:ext uri="{AF507438-7753-43e0-B8FC-AC1667EBCBE1}">
+          <a:ext uri="{AF507438-7753-43E0-B8FC-AC1667EBCBE1}">
             <a14:hiddenEffects xmlns:a14="http://schemas.microsoft.com/office/drawing/2010/main">
               <a:effectLst>
                 <a:outerShdw blurRad="63500" dist="38099" dir="2700000" algn="ctr" rotWithShape="0">
@@ -21015,7 +21056,7 @@
         </a:ln>
         <a:effectLst/>
         <a:extLst>
-          <a:ext uri="{AF507438-7753-43e0-B8FC-AC1667EBCBE1}">
+          <a:ext uri="{AF507438-7753-43E0-B8FC-AC1667EBCBE1}">
             <a14:hiddenEffects xmlns:a14="http://schemas.microsoft.com/office/drawing/2010/main">
               <a:effectLst>
                 <a:outerShdw blurRad="63500" dist="38099" dir="2700000" algn="ctr" rotWithShape="0">

</xml_diff>